<commit_message>
Update project 3 presentation.pptx
</commit_message>
<xml_diff>
--- a/project 3 presentation.pptx
+++ b/project 3 presentation.pptx
@@ -12,6 +12,7 @@
     <p:sldId id="273" r:id="rId6"/>
     <p:sldId id="274" r:id="rId7"/>
     <p:sldId id="271" r:id="rId8"/>
+    <p:sldId id="275" r:id="rId9"/>
   </p:sldIdLst>
   <p:sldSz cx="12192000" cy="6858000"/>
   <p:notesSz cx="6858000" cy="9144000"/>
@@ -288,7 +289,7 @@
           <a:p>
             <a:fld id="{48A87A34-81AB-432B-8DAE-1953F412C126}" type="datetimeFigureOut">
               <a:rPr lang="en-US" dirty="0"/>
-              <a:t>2/17/2021</a:t>
+              <a:t>2/18/2021</a:t>
             </a:fld>
             <a:endParaRPr lang="en-US" dirty="0"/>
           </a:p>
@@ -550,7 +551,7 @@
           <a:p>
             <a:fld id="{48A87A34-81AB-432B-8DAE-1953F412C126}" type="datetimeFigureOut">
               <a:rPr lang="en-US" dirty="0"/>
-              <a:t>2/17/2021</a:t>
+              <a:t>2/18/2021</a:t>
             </a:fld>
             <a:endParaRPr lang="en-US" dirty="0"/>
           </a:p>
@@ -777,7 +778,7 @@
             <a:fld id="{48A87A34-81AB-432B-8DAE-1953F412C126}" type="datetimeFigureOut">
               <a:rPr lang="en-US" dirty="0"/>
               <a:pPr/>
-              <a:t>2/17/2021</a:t>
+              <a:t>2/18/2021</a:t>
             </a:fld>
             <a:endParaRPr lang="en-US" dirty="0"/>
           </a:p>
@@ -1083,7 +1084,7 @@
             <a:fld id="{48A87A34-81AB-432B-8DAE-1953F412C126}" type="datetimeFigureOut">
               <a:rPr lang="en-US" dirty="0"/>
               <a:pPr/>
-              <a:t>2/17/2021</a:t>
+              <a:t>2/18/2021</a:t>
             </a:fld>
             <a:endParaRPr lang="en-US" dirty="0"/>
           </a:p>
@@ -1552,7 +1553,7 @@
             <a:fld id="{48A87A34-81AB-432B-8DAE-1953F412C126}" type="datetimeFigureOut">
               <a:rPr lang="en-US" dirty="0"/>
               <a:pPr/>
-              <a:t>2/17/2021</a:t>
+              <a:t>2/18/2021</a:t>
             </a:fld>
             <a:endParaRPr lang="en-US" dirty="0"/>
           </a:p>
@@ -2094,7 +2095,7 @@
           <a:p>
             <a:fld id="{48A87A34-81AB-432B-8DAE-1953F412C126}" type="datetimeFigureOut">
               <a:rPr lang="en-US" dirty="0"/>
-              <a:t>2/17/2021</a:t>
+              <a:t>2/18/2021</a:t>
             </a:fld>
             <a:endParaRPr lang="en-US" dirty="0"/>
           </a:p>
@@ -2863,7 +2864,7 @@
           <a:p>
             <a:fld id="{48A87A34-81AB-432B-8DAE-1953F412C126}" type="datetimeFigureOut">
               <a:rPr lang="en-US" dirty="0"/>
-              <a:t>2/17/2021</a:t>
+              <a:t>2/18/2021</a:t>
             </a:fld>
             <a:endParaRPr lang="en-US" dirty="0"/>
           </a:p>
@@ -3033,7 +3034,7 @@
           <a:p>
             <a:fld id="{48A87A34-81AB-432B-8DAE-1953F412C126}" type="datetimeFigureOut">
               <a:rPr lang="en-US" dirty="0"/>
-              <a:t>2/17/2021</a:t>
+              <a:t>2/18/2021</a:t>
             </a:fld>
             <a:endParaRPr lang="en-US" dirty="0"/>
           </a:p>
@@ -3252,7 +3253,7 @@
             <a:fld id="{48A87A34-81AB-432B-8DAE-1953F412C126}" type="datetimeFigureOut">
               <a:rPr lang="en-US" dirty="0"/>
               <a:pPr/>
-              <a:t>2/17/2021</a:t>
+              <a:t>2/18/2021</a:t>
             </a:fld>
             <a:endParaRPr lang="en-US" dirty="0"/>
           </a:p>
@@ -3427,7 +3428,7 @@
           <a:p>
             <a:fld id="{48A87A34-81AB-432B-8DAE-1953F412C126}" type="datetimeFigureOut">
               <a:rPr lang="en-US" dirty="0"/>
-              <a:t>2/17/2021</a:t>
+              <a:t>2/18/2021</a:t>
             </a:fld>
             <a:endParaRPr lang="en-US" dirty="0"/>
           </a:p>
@@ -3712,7 +3713,7 @@
             <a:fld id="{48A87A34-81AB-432B-8DAE-1953F412C126}" type="datetimeFigureOut">
               <a:rPr lang="en-US" dirty="0"/>
               <a:pPr/>
-              <a:t>2/17/2021</a:t>
+              <a:t>2/18/2021</a:t>
             </a:fld>
             <a:endParaRPr lang="en-US" dirty="0"/>
           </a:p>
@@ -3949,7 +3950,7 @@
           <a:p>
             <a:fld id="{48A87A34-81AB-432B-8DAE-1953F412C126}" type="datetimeFigureOut">
               <a:rPr lang="en-US" dirty="0"/>
-              <a:t>2/17/2021</a:t>
+              <a:t>2/18/2021</a:t>
             </a:fld>
             <a:endParaRPr lang="en-US" dirty="0"/>
           </a:p>
@@ -4323,7 +4324,7 @@
           <a:p>
             <a:fld id="{48A87A34-81AB-432B-8DAE-1953F412C126}" type="datetimeFigureOut">
               <a:rPr lang="en-US" dirty="0"/>
-              <a:t>2/17/2021</a:t>
+              <a:t>2/18/2021</a:t>
             </a:fld>
             <a:endParaRPr lang="en-US" dirty="0"/>
           </a:p>
@@ -4436,7 +4437,7 @@
           <a:p>
             <a:fld id="{48A87A34-81AB-432B-8DAE-1953F412C126}" type="datetimeFigureOut">
               <a:rPr lang="en-US" dirty="0"/>
-              <a:t>2/17/2021</a:t>
+              <a:t>2/18/2021</a:t>
             </a:fld>
             <a:endParaRPr lang="en-US" dirty="0"/>
           </a:p>
@@ -4526,7 +4527,7 @@
           <a:p>
             <a:fld id="{48A87A34-81AB-432B-8DAE-1953F412C126}" type="datetimeFigureOut">
               <a:rPr lang="en-US" dirty="0"/>
-              <a:t>2/17/2021</a:t>
+              <a:t>2/18/2021</a:t>
             </a:fld>
             <a:endParaRPr lang="en-US" dirty="0"/>
           </a:p>
@@ -4770,7 +4771,7 @@
           <a:p>
             <a:fld id="{48A87A34-81AB-432B-8DAE-1953F412C126}" type="datetimeFigureOut">
               <a:rPr lang="en-US" dirty="0"/>
-              <a:t>2/17/2021</a:t>
+              <a:t>2/18/2021</a:t>
             </a:fld>
             <a:endParaRPr lang="en-US" dirty="0"/>
           </a:p>
@@ -5022,7 +5023,7 @@
           <a:p>
             <a:fld id="{48A87A34-81AB-432B-8DAE-1953F412C126}" type="datetimeFigureOut">
               <a:rPr lang="en-US" dirty="0"/>
-              <a:t>2/17/2021</a:t>
+              <a:t>2/18/2021</a:t>
             </a:fld>
             <a:endParaRPr lang="en-US" dirty="0"/>
           </a:p>
@@ -5261,7 +5262,7 @@
             <a:fld id="{48A87A34-81AB-432B-8DAE-1953F412C126}" type="datetimeFigureOut">
               <a:rPr lang="en-US" dirty="0"/>
               <a:pPr/>
-              <a:t>2/17/2021</a:t>
+              <a:t>2/18/2021</a:t>
             </a:fld>
             <a:endParaRPr lang="en-US" dirty="0"/>
           </a:p>
@@ -5701,24 +5702,52 @@
             <a:br>
               <a:rPr lang="en-US" dirty="0"/>
             </a:br>
+            <a:r>
+              <a:rPr lang="en-US" dirty="0"/>
+              <a:t/>
+            </a:r>
             <a:br>
               <a:rPr lang="en-US" dirty="0"/>
             </a:br>
+            <a:r>
+              <a:rPr lang="en-US" dirty="0"/>
+              <a:t/>
+            </a:r>
             <a:br>
               <a:rPr lang="en-US" dirty="0"/>
             </a:br>
+            <a:r>
+              <a:rPr lang="en-US" dirty="0"/>
+              <a:t/>
+            </a:r>
             <a:br>
               <a:rPr lang="en-US" dirty="0"/>
             </a:br>
+            <a:r>
+              <a:rPr lang="en-US" dirty="0"/>
+              <a:t/>
+            </a:r>
             <a:br>
               <a:rPr lang="en-US" dirty="0"/>
             </a:br>
+            <a:r>
+              <a:rPr lang="en-US" dirty="0"/>
+              <a:t/>
+            </a:r>
             <a:br>
               <a:rPr lang="en-US" dirty="0"/>
             </a:br>
+            <a:r>
+              <a:rPr lang="en-US" dirty="0"/>
+              <a:t/>
+            </a:r>
             <a:br>
               <a:rPr lang="en-US" dirty="0"/>
             </a:br>
+            <a:r>
+              <a:rPr lang="en-US" dirty="0"/>
+              <a:t/>
+            </a:r>
             <a:br>
               <a:rPr lang="en-US" dirty="0"/>
             </a:br>
@@ -5729,6 +5758,10 @@
             <a:br>
               <a:rPr lang="en-US" dirty="0"/>
             </a:br>
+            <a:r>
+              <a:rPr lang="en-US" dirty="0"/>
+              <a:t/>
+            </a:r>
             <a:br>
               <a:rPr lang="en-US" dirty="0"/>
             </a:br>
@@ -5736,6 +5769,10 @@
               <a:rPr lang="en-US" sz="1200" b="1" dirty="0"/>
               <a:t>Project team:</a:t>
             </a:r>
+            <a:r>
+              <a:rPr lang="en-US" dirty="0"/>
+              <a:t/>
+            </a:r>
             <a:br>
               <a:rPr lang="en-US" dirty="0"/>
             </a:br>
@@ -5746,6 +5783,10 @@
             <a:r>
               <a:rPr lang="en-US" sz="1100" dirty="0" err="1"/>
               <a:t>Alafa</a:t>
+            </a:r>
+            <a:r>
+              <a:rPr lang="en-US" sz="1100" dirty="0"/>
+              <a:t/>
             </a:r>
             <a:br>
               <a:rPr lang="en-US" sz="1100" dirty="0"/>
@@ -5762,6 +5803,10 @@
               <a:rPr lang="en-US" sz="1100" dirty="0" err="1"/>
               <a:t>Tiemani</a:t>
             </a:r>
+            <a:r>
+              <a:rPr lang="en-US" sz="1100" dirty="0"/>
+              <a:t/>
+            </a:r>
             <a:br>
               <a:rPr lang="en-US" sz="1100" dirty="0"/>
             </a:br>
@@ -5777,6 +5822,10 @@
               <a:rPr lang="en-US" sz="1100" dirty="0" err="1"/>
               <a:t>Hamadne</a:t>
             </a:r>
+            <a:r>
+              <a:rPr lang="en-US" sz="1100" dirty="0"/>
+              <a:t/>
+            </a:r>
             <a:br>
               <a:rPr lang="en-US" sz="1100" dirty="0"/>
             </a:br>
@@ -5788,9 +5837,17 @@
               <a:rPr lang="en-US" sz="1100" dirty="0" err="1"/>
               <a:t>Zarringhalam</a:t>
             </a:r>
+            <a:r>
+              <a:rPr lang="en-US" dirty="0"/>
+              <a:t/>
+            </a:r>
             <a:br>
               <a:rPr lang="en-US" dirty="0"/>
             </a:br>
+            <a:r>
+              <a:rPr lang="en-US" dirty="0"/>
+              <a:t/>
+            </a:r>
             <a:br>
               <a:rPr lang="en-US" dirty="0"/>
             </a:br>
@@ -5804,7 +5861,7 @@
       </p:sp>
       <p:pic>
         <p:nvPicPr>
-          <p:cNvPr id="5" name="Picture 4"/>
+          <p:cNvPr id="4" name="Picture 3"/>
           <p:cNvPicPr>
             <a:picLocks noChangeAspect="1"/>
           </p:cNvPicPr>
@@ -5818,8 +5875,8 @@
         </p:blipFill>
         <p:spPr>
           <a:xfrm>
-            <a:off x="2449679" y="1058779"/>
-            <a:ext cx="6410325" cy="1190625"/>
+            <a:off x="4451294" y="1058779"/>
+            <a:ext cx="2238375" cy="695325"/>
           </a:xfrm>
           <a:prstGeom prst="rect">
             <a:avLst/>
@@ -5836,6 +5893,13 @@
   <p:clrMapOvr>
     <a:masterClrMapping/>
   </p:clrMapOvr>
+  <p:timing>
+    <p:tnLst>
+      <p:par>
+        <p:cTn id="1" dur="indefinite" restart="never" nodeType="tmRoot"/>
+      </p:par>
+    </p:tnLst>
+  </p:timing>
 </p:sld>
 </file>
 
@@ -5948,7 +6012,15 @@
             </a:pPr>
             <a:r>
               <a:rPr lang="en-US" sz="1600" dirty="0"/>
-              <a:t>2.	Reading the data from the Azure PostgreSQL Database</a:t>
+              <a:t>2.	Reading the data </a:t>
+            </a:r>
+            <a:r>
+              <a:rPr lang="en-US" sz="1600" dirty="0" smtClean="0"/>
+              <a:t>from </a:t>
+            </a:r>
+            <a:r>
+              <a:rPr lang="en-US" sz="1600" dirty="0"/>
+              <a:t>Azure PostgreSQL Database</a:t>
             </a:r>
           </a:p>
           <a:p>
@@ -6012,6 +6084,13 @@
   <p:clrMapOvr>
     <a:masterClrMapping/>
   </p:clrMapOvr>
+  <p:timing>
+    <p:tnLst>
+      <p:par>
+        <p:cTn id="1" dur="indefinite" restart="never" nodeType="tmRoot"/>
+      </p:par>
+    </p:tnLst>
+  </p:timing>
 </p:sld>
 </file>
 
@@ -6194,6 +6273,13 @@
   <p:clrMapOvr>
     <a:masterClrMapping/>
   </p:clrMapOvr>
+  <p:timing>
+    <p:tnLst>
+      <p:par>
+        <p:cTn id="1" dur="indefinite" restart="never" nodeType="tmRoot"/>
+      </p:par>
+    </p:tnLst>
+  </p:timing>
 </p:sld>
 </file>
 
@@ -6411,6 +6497,13 @@
   <p:clrMapOvr>
     <a:masterClrMapping/>
   </p:clrMapOvr>
+  <p:timing>
+    <p:tnLst>
+      <p:par>
+        <p:cTn id="1" dur="indefinite" restart="never" nodeType="tmRoot"/>
+      </p:par>
+    </p:tnLst>
+  </p:timing>
 </p:sld>
 </file>
 
@@ -6493,7 +6586,15 @@
           <a:p>
             <a:r>
               <a:rPr lang="en-US" dirty="0"/>
-              <a:t>The project is powered by a data set with at least 24000 records.</a:t>
+              <a:t>The project is powered by a data set with at least </a:t>
+            </a:r>
+            <a:r>
+              <a:rPr lang="en-US" dirty="0" smtClean="0"/>
+              <a:t>3000 </a:t>
+            </a:r>
+            <a:r>
+              <a:rPr lang="en-US" dirty="0"/>
+              <a:t>records.</a:t>
             </a:r>
           </a:p>
           <a:p>
@@ -6541,6 +6642,13 @@
   <p:clrMapOvr>
     <a:masterClrMapping/>
   </p:clrMapOvr>
+  <p:timing>
+    <p:tnLst>
+      <p:par>
+        <p:cTn id="1" dur="indefinite" restart="never" nodeType="tmRoot"/>
+      </p:par>
+    </p:tnLst>
+  </p:timing>
 </p:sld>
 </file>
 
@@ -6671,6 +6779,13 @@
   <p:clrMapOvr>
     <a:masterClrMapping/>
   </p:clrMapOvr>
+  <p:timing>
+    <p:tnLst>
+      <p:par>
+        <p:cTn id="1" dur="indefinite" restart="never" nodeType="tmRoot"/>
+      </p:par>
+    </p:tnLst>
+  </p:timing>
 </p:sld>
 </file>
 
@@ -6822,6 +6937,201 @@
   <p:clrMapOvr>
     <a:masterClrMapping/>
   </p:clrMapOvr>
+  <p:timing>
+    <p:tnLst>
+      <p:par>
+        <p:cTn id="1" dur="indefinite" restart="never" nodeType="tmRoot"/>
+      </p:par>
+    </p:tnLst>
+  </p:timing>
+</p:sld>
+</file>
+
+<file path=ppt/slides/slide8.xml><?xml version="1.0" encoding="utf-8"?>
+<p:sld xmlns:a="http://schemas.openxmlformats.org/drawingml/2006/main" xmlns:r="http://schemas.openxmlformats.org/officeDocument/2006/relationships" xmlns:p="http://schemas.openxmlformats.org/presentationml/2006/main">
+  <p:cSld>
+    <p:spTree>
+      <p:nvGrpSpPr>
+        <p:cNvPr id="1" name=""/>
+        <p:cNvGrpSpPr/>
+        <p:nvPr/>
+      </p:nvGrpSpPr>
+      <p:grpSpPr>
+        <a:xfrm>
+          <a:off x="0" y="0"/>
+          <a:ext cx="0" cy="0"/>
+          <a:chOff x="0" y="0"/>
+          <a:chExt cx="0" cy="0"/>
+        </a:xfrm>
+      </p:grpSpPr>
+      <p:sp>
+        <p:nvSpPr>
+          <p:cNvPr id="2" name="Title 1"/>
+          <p:cNvSpPr>
+            <a:spLocks noGrp="1"/>
+          </p:cNvSpPr>
+          <p:nvPr>
+            <p:ph type="ctrTitle"/>
+          </p:nvPr>
+        </p:nvSpPr>
+        <p:spPr>
+          <a:xfrm>
+            <a:off x="1371600" y="1058779"/>
+            <a:ext cx="9448800" cy="4196393"/>
+          </a:xfrm>
+        </p:spPr>
+        <p:txBody>
+          <a:bodyPr>
+            <a:normAutofit fontScale="90000"/>
+          </a:bodyPr>
+          <a:lstStyle/>
+          <a:p>
+            <a:pPr marL="1143000" indent="-1143000">
+              <a:buFont typeface="Arial" panose="020B0604020202020204" pitchFamily="34" charset="0"/>
+              <a:buChar char="•"/>
+            </a:pPr>
+            <a:r>
+              <a:rPr lang="en-US" dirty="0"/>
+              <a:t>    </a:t>
+            </a:r>
+            <a:br>
+              <a:rPr lang="en-US" dirty="0"/>
+            </a:br>
+            <a:r>
+              <a:rPr lang="en-US" dirty="0"/>
+              <a:t/>
+            </a:r>
+            <a:br>
+              <a:rPr lang="en-US" dirty="0"/>
+            </a:br>
+            <a:r>
+              <a:rPr lang="en-US" dirty="0"/>
+              <a:t/>
+            </a:r>
+            <a:br>
+              <a:rPr lang="en-US" dirty="0"/>
+            </a:br>
+            <a:r>
+              <a:rPr lang="en-US" dirty="0"/>
+              <a:t/>
+            </a:r>
+            <a:br>
+              <a:rPr lang="en-US" dirty="0"/>
+            </a:br>
+            <a:r>
+              <a:rPr lang="en-US" dirty="0"/>
+              <a:t/>
+            </a:r>
+            <a:br>
+              <a:rPr lang="en-US" dirty="0"/>
+            </a:br>
+            <a:r>
+              <a:rPr lang="en-US" dirty="0"/>
+              <a:t/>
+            </a:r>
+            <a:br>
+              <a:rPr lang="en-US" dirty="0"/>
+            </a:br>
+            <a:r>
+              <a:rPr lang="en-US" dirty="0"/>
+              <a:t/>
+            </a:r>
+            <a:br>
+              <a:rPr lang="en-US" dirty="0"/>
+            </a:br>
+            <a:r>
+              <a:rPr lang="en-US" dirty="0"/>
+              <a:t/>
+            </a:r>
+            <a:br>
+              <a:rPr lang="en-US" dirty="0"/>
+            </a:br>
+            <a:r>
+              <a:rPr lang="en-US" dirty="0"/>
+              <a:t> </a:t>
+            </a:r>
+            <a:r>
+              <a:rPr lang="en-US" dirty="0" smtClean="0"/>
+              <a:t>     </a:t>
+            </a:r>
+            <a:r>
+              <a:rPr lang="en-US" sz="6700" dirty="0" smtClean="0"/>
+              <a:t>Thank you</a:t>
+            </a:r>
+            <a:r>
+              <a:rPr lang="en-US" sz="6700" dirty="0" smtClean="0"/>
+              <a:t> </a:t>
+            </a:r>
+            <a:r>
+              <a:rPr lang="en-US" dirty="0"/>
+              <a:t/>
+            </a:r>
+            <a:br>
+              <a:rPr lang="en-US" dirty="0"/>
+            </a:br>
+            <a:r>
+              <a:rPr lang="en-US" dirty="0"/>
+              <a:t/>
+            </a:r>
+            <a:br>
+              <a:rPr lang="en-US" dirty="0"/>
+            </a:br>
+            <a:r>
+              <a:rPr lang="en-US" dirty="0"/>
+              <a:t/>
+            </a:r>
+            <a:br>
+              <a:rPr lang="en-US" dirty="0"/>
+            </a:br>
+            <a:r>
+              <a:rPr lang="en-US" sz="1100" dirty="0"/>
+              <a:t>	</a:t>
+            </a:r>
+            <a:endParaRPr lang="en-US" dirty="0"/>
+          </a:p>
+        </p:txBody>
+      </p:sp>
+      <p:pic>
+        <p:nvPicPr>
+          <p:cNvPr id="4" name="Picture 3"/>
+          <p:cNvPicPr>
+            <a:picLocks noChangeAspect="1"/>
+          </p:cNvPicPr>
+          <p:nvPr/>
+        </p:nvPicPr>
+        <p:blipFill>
+          <a:blip r:embed="rId2"/>
+          <a:stretch>
+            <a:fillRect/>
+          </a:stretch>
+        </p:blipFill>
+        <p:spPr>
+          <a:xfrm>
+            <a:off x="4608949" y="832124"/>
+            <a:ext cx="2238375" cy="695325"/>
+          </a:xfrm>
+          <a:prstGeom prst="rect">
+            <a:avLst/>
+          </a:prstGeom>
+        </p:spPr>
+      </p:pic>
+    </p:spTree>
+    <p:extLst>
+      <p:ext uri="{BB962C8B-B14F-4D97-AF65-F5344CB8AC3E}">
+        <p14:creationId xmlns:p14="http://schemas.microsoft.com/office/powerpoint/2010/main" val="1873458604"/>
+      </p:ext>
+    </p:extLst>
+  </p:cSld>
+  <p:clrMapOvr>
+    <a:masterClrMapping/>
+  </p:clrMapOvr>
+  <p:timing>
+    <p:tnLst>
+      <p:par>
+        <p:cTn id="1" dur="indefinite" restart="never" nodeType="tmRoot"/>
+      </p:par>
+    </p:tnLst>
+  </p:timing>
 </p:sld>
 </file>
 

</xml_diff>